<commit_message>
Update TROY- Hasan OZKARA_yeni.pptx
</commit_message>
<xml_diff>
--- a/Troy Tech - Presentation/TROY- Hasan OZKARA_yeni.pptx
+++ b/Troy Tech - Presentation/TROY- Hasan OZKARA_yeni.pptx
@@ -10230,6 +10230,31 @@
             </a:r>
           </a:p>
           <a:p>
+            <a:r>
+              <a:rPr lang="en-GB" dirty="0"/>
+              <a:t>Overall System Components</a:t>
+            </a:r>
+          </a:p>
+          <a:p>
+            <a:r>
+              <a:rPr lang="en-GB" dirty="0"/>
+              <a:t>Video and Command Transmission</a:t>
+            </a:r>
+          </a:p>
+          <a:p>
+            <a:r>
+              <a:rPr lang="en-GB" dirty="0"/>
+              <a:t>Motor Drive and Shooting Systems</a:t>
+            </a:r>
+          </a:p>
+          <a:p>
+            <a:r>
+              <a:rPr lang="en-GB"/>
+              <a:t>Conclusion</a:t>
+            </a:r>
+            <a:endParaRPr lang="en-GB" dirty="0"/>
+          </a:p>
+          <a:p>
             <a:pPr marL="0" indent="0">
               <a:buNone/>
             </a:pPr>

</xml_diff>